<commit_message>
minor changes to make more robust the analysis
</commit_message>
<xml_diff>
--- a/Documentation/3. Record alignment by subjects.pptx
+++ b/Documentation/3. Record alignment by subjects.pptx
@@ -213,7 +213,7 @@
           <a:p>
             <a:fld id="{1A21894F-B278-4D96-9594-A030EA633187}" type="datetimeFigureOut">
               <a:rPr lang="it-IT" smtClean="0"/>
-              <a:t>20/08/2024</a:t>
+              <a:t>03/09/2024</a:t>
             </a:fld>
             <a:endParaRPr lang="it-IT"/>
           </a:p>
@@ -2261,7 +2261,7 @@
           <a:p>
             <a:fld id="{58E4D78B-0F35-4E3B-A0B9-554BA787D8A4}" type="datetime1">
               <a:rPr lang="en-US" smtClean="0"/>
-              <a:t>8/20/2024</a:t>
+              <a:t>9/3/2024</a:t>
             </a:fld>
             <a:endParaRPr lang="en-US"/>
           </a:p>
@@ -2471,7 +2471,7 @@
           <a:p>
             <a:fld id="{604487E5-BE79-4BAC-AEB7-0CE0533B5E5C}" type="datetime1">
               <a:rPr lang="en-US" smtClean="0"/>
-              <a:t>8/20/2024</a:t>
+              <a:t>9/3/2024</a:t>
             </a:fld>
             <a:endParaRPr lang="en-US"/>
           </a:p>
@@ -2671,7 +2671,7 @@
           <a:p>
             <a:fld id="{DDA7E0CB-9E21-49FD-99A0-0CD75BBC45F4}" type="datetime1">
               <a:rPr lang="en-US" smtClean="0"/>
-              <a:t>8/20/2024</a:t>
+              <a:t>9/3/2024</a:t>
             </a:fld>
             <a:endParaRPr lang="en-US"/>
           </a:p>
@@ -2947,7 +2947,7 @@
           <a:p>
             <a:fld id="{661D7149-FE96-419A-8F67-9BD351842985}" type="datetime1">
               <a:rPr lang="en-US" smtClean="0"/>
-              <a:t>8/20/2024</a:t>
+              <a:t>9/3/2024</a:t>
             </a:fld>
             <a:endParaRPr lang="en-US"/>
           </a:p>
@@ -3215,7 +3215,7 @@
           <a:p>
             <a:fld id="{6CA97CEF-DD94-4A20-85BC-5094F3EA8887}" type="datetime1">
               <a:rPr lang="en-US" smtClean="0"/>
-              <a:t>8/20/2024</a:t>
+              <a:t>9/3/2024</a:t>
             </a:fld>
             <a:endParaRPr lang="en-US"/>
           </a:p>
@@ -3630,7 +3630,7 @@
           <a:p>
             <a:fld id="{9862EB4C-45F8-47BA-B435-B6097D61B684}" type="datetime1">
               <a:rPr lang="en-US" smtClean="0"/>
-              <a:t>8/20/2024</a:t>
+              <a:t>9/3/2024</a:t>
             </a:fld>
             <a:endParaRPr lang="en-US"/>
           </a:p>
@@ -3772,7 +3772,7 @@
           <a:p>
             <a:fld id="{FA7CD0E2-B7EC-4D81-9389-8F889EE865AB}" type="datetime1">
               <a:rPr lang="en-US" smtClean="0"/>
-              <a:t>8/20/2024</a:t>
+              <a:t>9/3/2024</a:t>
             </a:fld>
             <a:endParaRPr lang="en-US"/>
           </a:p>
@@ -3885,7 +3885,7 @@
           <a:p>
             <a:fld id="{18B47F5C-7FA0-44DA-BF82-413AB90208B7}" type="datetime1">
               <a:rPr lang="en-US" smtClean="0"/>
-              <a:t>8/20/2024</a:t>
+              <a:t>9/3/2024</a:t>
             </a:fld>
             <a:endParaRPr lang="en-US"/>
           </a:p>
@@ -4198,7 +4198,7 @@
           <a:p>
             <a:fld id="{403415A8-F8BD-47CC-8D20-53798396961D}" type="datetime1">
               <a:rPr lang="en-US" smtClean="0"/>
-              <a:t>8/20/2024</a:t>
+              <a:t>9/3/2024</a:t>
             </a:fld>
             <a:endParaRPr lang="en-US"/>
           </a:p>
@@ -4487,7 +4487,7 @@
           <a:p>
             <a:fld id="{6A12F5A1-6669-4CDD-B1B4-04FFE5C41ADE}" type="datetime1">
               <a:rPr lang="en-US" smtClean="0"/>
-              <a:t>8/20/2024</a:t>
+              <a:t>9/3/2024</a:t>
             </a:fld>
             <a:endParaRPr lang="en-US"/>
           </a:p>
@@ -4691,7 +4691,7 @@
           <a:p>
             <a:fld id="{63421662-C242-4258-8799-9F32C0D7CC75}" type="datetime1">
               <a:rPr lang="en-US" smtClean="0"/>
-              <a:t>8/20/2024</a:t>
+              <a:t>9/3/2024</a:t>
             </a:fld>
             <a:endParaRPr lang="en-US"/>
           </a:p>

</xml_diff>